<commit_message>
lectures 2 & 3
</commit_message>
<xml_diff>
--- a/lectures/02_unix.pptx
+++ b/lectures/02_unix.pptx
@@ -243,7 +243,7 @@
           <a:p>
             <a:fld id="{B0836F12-EC0D-0343-8C1A-C7DE24416774}" type="datetimeFigureOut">
               <a:rPr lang="en-US" smtClean="0"/>
-              <a:t>2/1/26</a:t>
+              <a:t>2/2/26</a:t>
             </a:fld>
             <a:endParaRPr lang="en-US"/>
           </a:p>
@@ -408,7 +408,7 @@
           <a:p>
             <a:fld id="{8563B117-C548-C24D-B5EC-9EEE3D79DFC1}" type="datetimeFigureOut">
               <a:rPr lang="en-US" smtClean="0"/>
-              <a:t>2/1/26</a:t>
+              <a:t>2/2/26</a:t>
             </a:fld>
             <a:endParaRPr lang="en-US"/>
           </a:p>
@@ -2053,7 +2053,7 @@
           <a:p>
             <a:fld id="{60539F5D-AA60-3342-98DF-B6AF9FAAD332}" type="datetimeFigureOut">
               <a:rPr lang="en-US" smtClean="0"/>
-              <a:t>2/1/26</a:t>
+              <a:t>2/2/26</a:t>
             </a:fld>
             <a:endParaRPr lang="en-US"/>
           </a:p>
@@ -2221,7 +2221,7 @@
           <a:p>
             <a:fld id="{60539F5D-AA60-3342-98DF-B6AF9FAAD332}" type="datetimeFigureOut">
               <a:rPr lang="en-US" smtClean="0"/>
-              <a:t>2/1/26</a:t>
+              <a:t>2/2/26</a:t>
             </a:fld>
             <a:endParaRPr lang="en-US"/>
           </a:p>
@@ -2399,7 +2399,7 @@
           <a:p>
             <a:fld id="{60539F5D-AA60-3342-98DF-B6AF9FAAD332}" type="datetimeFigureOut">
               <a:rPr lang="en-US" smtClean="0"/>
-              <a:t>2/1/26</a:t>
+              <a:t>2/2/26</a:t>
             </a:fld>
             <a:endParaRPr lang="en-US"/>
           </a:p>
@@ -2567,7 +2567,7 @@
           <a:p>
             <a:fld id="{60539F5D-AA60-3342-98DF-B6AF9FAAD332}" type="datetimeFigureOut">
               <a:rPr lang="en-US" smtClean="0"/>
-              <a:t>2/1/26</a:t>
+              <a:t>2/2/26</a:t>
             </a:fld>
             <a:endParaRPr lang="en-US"/>
           </a:p>
@@ -2812,7 +2812,7 @@
           <a:p>
             <a:fld id="{60539F5D-AA60-3342-98DF-B6AF9FAAD332}" type="datetimeFigureOut">
               <a:rPr lang="en-US" smtClean="0"/>
-              <a:t>2/1/26</a:t>
+              <a:t>2/2/26</a:t>
             </a:fld>
             <a:endParaRPr lang="en-US"/>
           </a:p>
@@ -3097,7 +3097,7 @@
           <a:p>
             <a:fld id="{60539F5D-AA60-3342-98DF-B6AF9FAAD332}" type="datetimeFigureOut">
               <a:rPr lang="en-US" smtClean="0"/>
-              <a:t>2/1/26</a:t>
+              <a:t>2/2/26</a:t>
             </a:fld>
             <a:endParaRPr lang="en-US"/>
           </a:p>
@@ -3516,7 +3516,7 @@
           <a:p>
             <a:fld id="{60539F5D-AA60-3342-98DF-B6AF9FAAD332}" type="datetimeFigureOut">
               <a:rPr lang="en-US" smtClean="0"/>
-              <a:t>2/1/26</a:t>
+              <a:t>2/2/26</a:t>
             </a:fld>
             <a:endParaRPr lang="en-US"/>
           </a:p>
@@ -3633,7 +3633,7 @@
           <a:p>
             <a:fld id="{60539F5D-AA60-3342-98DF-B6AF9FAAD332}" type="datetimeFigureOut">
               <a:rPr lang="en-US" smtClean="0"/>
-              <a:t>2/1/26</a:t>
+              <a:t>2/2/26</a:t>
             </a:fld>
             <a:endParaRPr lang="en-US"/>
           </a:p>
@@ -3728,7 +3728,7 @@
           <a:p>
             <a:fld id="{60539F5D-AA60-3342-98DF-B6AF9FAAD332}" type="datetimeFigureOut">
               <a:rPr lang="en-US" smtClean="0"/>
-              <a:t>2/1/26</a:t>
+              <a:t>2/2/26</a:t>
             </a:fld>
             <a:endParaRPr lang="en-US"/>
           </a:p>
@@ -4003,7 +4003,7 @@
           <a:p>
             <a:fld id="{60539F5D-AA60-3342-98DF-B6AF9FAAD332}" type="datetimeFigureOut">
               <a:rPr lang="en-US" smtClean="0"/>
-              <a:t>2/1/26</a:t>
+              <a:t>2/2/26</a:t>
             </a:fld>
             <a:endParaRPr lang="en-US"/>
           </a:p>
@@ -4255,7 +4255,7 @@
           <a:p>
             <a:fld id="{60539F5D-AA60-3342-98DF-B6AF9FAAD332}" type="datetimeFigureOut">
               <a:rPr lang="en-US" smtClean="0"/>
-              <a:t>2/1/26</a:t>
+              <a:t>2/2/26</a:t>
             </a:fld>
             <a:endParaRPr lang="en-US"/>
           </a:p>
@@ -4466,7 +4466,7 @@
           <a:p>
             <a:fld id="{60539F5D-AA60-3342-98DF-B6AF9FAAD332}" type="datetimeFigureOut">
               <a:rPr lang="en-US" smtClean="0"/>
-              <a:t>2/1/26</a:t>
+              <a:t>2/2/26</a:t>
             </a:fld>
             <a:endParaRPr lang="en-US"/>
           </a:p>
@@ -5560,21 +5560,24 @@
                 <a:latin typeface="Calibri"/>
                 <a:cs typeface="Calibri"/>
               </a:rPr>
-              <a:t>How many genes in the watermelon </a:t>
+              <a:t>How many lines in </a:t>
             </a:r>
             <a:r>
               <a:rPr lang="en-US" sz="2400" dirty="0" err="1">
-                <a:latin typeface="Calibri"/>
-                <a:cs typeface="Calibri"/>
-              </a:rPr>
-              <a:t>mt</a:t>
+                <a:solidFill>
+                  <a:srgbClr val="0000FF"/>
+                </a:solidFill>
+                <a:latin typeface="Courier"/>
+                <a:cs typeface="Courier"/>
+              </a:rPr>
+              <a:t>fruit.txt</a:t>
             </a:r>
             <a:r>
               <a:rPr lang="en-US" sz="2400" dirty="0">
                 <a:latin typeface="Calibri"/>
                 <a:cs typeface="Calibri"/>
               </a:rPr>
-              <a:t> genome?</a:t>
+              <a:t>?</a:t>
             </a:r>
           </a:p>
           <a:p>
@@ -5590,7 +5593,24 @@
                 <a:latin typeface="Calibri"/>
                 <a:cs typeface="Calibri"/>
               </a:rPr>
-              <a:t>How many ribosomal protein genes?</a:t>
+              <a:t>How many songs on </a:t>
+            </a:r>
+            <a:r>
+              <a:rPr lang="en-US" sz="2400" dirty="0" err="1">
+                <a:solidFill>
+                  <a:srgbClr val="0000FF"/>
+                </a:solidFill>
+                <a:latin typeface="Courier"/>
+                <a:cs typeface="Courier"/>
+              </a:rPr>
+              <a:t>cowboy_carter.txt</a:t>
+            </a:r>
+            <a:r>
+              <a:rPr lang="en-US" sz="2400" dirty="0">
+                <a:latin typeface="Calibri"/>
+                <a:cs typeface="Calibri"/>
+              </a:rPr>
+              <a:t>?</a:t>
             </a:r>
           </a:p>
         </p:txBody>
@@ -6370,6 +6390,16 @@
               <a:t>$ </a:t>
             </a:r>
             <a:r>
+              <a:rPr lang="en-US" sz="2400" dirty="0">
+                <a:solidFill>
+                  <a:srgbClr val="0000FF"/>
+                </a:solidFill>
+                <a:latin typeface="Courier"/>
+                <a:cs typeface="Courier"/>
+              </a:rPr>
+              <a:t>grep apple </a:t>
+            </a:r>
+            <a:r>
               <a:rPr lang="en-US" sz="2400" dirty="0" err="1">
                 <a:solidFill>
                   <a:srgbClr val="0000FF"/>
@@ -6377,47 +6407,7 @@
                 <a:latin typeface="Courier"/>
                 <a:cs typeface="Courier"/>
               </a:rPr>
-              <a:t>grep</a:t>
-            </a:r>
-            <a:r>
-              <a:rPr lang="en-US" sz="2400" dirty="0">
-                <a:solidFill>
-                  <a:srgbClr val="0000FF"/>
-                </a:solidFill>
-                <a:latin typeface="Courier"/>
-                <a:cs typeface="Courier"/>
-              </a:rPr>
-              <a:t> </a:t>
-            </a:r>
-            <a:r>
-              <a:rPr lang="en-US" sz="2400" dirty="0" err="1">
-                <a:solidFill>
-                  <a:srgbClr val="0000FF"/>
-                </a:solidFill>
-                <a:latin typeface="Courier"/>
-                <a:cs typeface="Courier"/>
-              </a:rPr>
-              <a:t>rps</a:t>
-            </a:r>
-            <a:r>
-              <a:rPr lang="en-US" sz="2400" dirty="0">
-                <a:solidFill>
-                  <a:srgbClr val="0000FF"/>
-                </a:solidFill>
-                <a:latin typeface="Courier"/>
-                <a:cs typeface="Courier"/>
-              </a:rPr>
-              <a:t> </a:t>
-            </a:r>
-            <a:r>
-              <a:rPr lang="en-US" sz="2400" dirty="0" err="1">
-                <a:solidFill>
-                  <a:srgbClr val="0000FF"/>
-                </a:solidFill>
-                <a:latin typeface="Courier"/>
-                <a:cs typeface="Courier"/>
-              </a:rPr>
-              <a:t>watermelon_genes.unix.txt</a:t>
+              <a:t>fruit.txt</a:t>
             </a:r>
             <a:endParaRPr lang="en-US" sz="2400" u="sng" dirty="0">
               <a:solidFill>
@@ -6441,6 +6431,16 @@
               <a:t>$ </a:t>
             </a:r>
             <a:r>
+              <a:rPr lang="en-US" sz="2400" dirty="0">
+                <a:solidFill>
+                  <a:srgbClr val="0000FF"/>
+                </a:solidFill>
+                <a:latin typeface="Courier"/>
+                <a:cs typeface="Courier"/>
+              </a:rPr>
+              <a:t>grep –</a:t>
+            </a:r>
+            <a:r>
               <a:rPr lang="en-US" sz="2400" dirty="0" err="1">
                 <a:solidFill>
                   <a:srgbClr val="0000FF"/>
@@ -6448,7 +6448,7 @@
                 <a:latin typeface="Courier"/>
                 <a:cs typeface="Courier"/>
               </a:rPr>
-              <a:t>grep</a:t>
+              <a:t>i</a:t>
             </a:r>
             <a:r>
               <a:rPr lang="en-US" sz="2400" dirty="0">
@@ -6458,7 +6458,7 @@
                 <a:latin typeface="Courier"/>
                 <a:cs typeface="Courier"/>
               </a:rPr>
-              <a:t> co </a:t>
+              <a:t> mi </a:t>
             </a:r>
             <a:r>
               <a:rPr lang="en-US" sz="2400" dirty="0" err="1">
@@ -6468,7 +6468,7 @@
                 <a:latin typeface="Courier"/>
                 <a:cs typeface="Courier"/>
               </a:rPr>
-              <a:t>watermelon_genes.unix.txt</a:t>
+              <a:t>fruit.txt</a:t>
             </a:r>
             <a:endParaRPr lang="en-US" sz="2400" dirty="0">
               <a:solidFill>
@@ -6492,6 +6492,16 @@
               <a:t>$ </a:t>
             </a:r>
             <a:r>
+              <a:rPr lang="en-US" sz="2400" dirty="0">
+                <a:solidFill>
+                  <a:srgbClr val="0000FF"/>
+                </a:solidFill>
+                <a:latin typeface="Courier"/>
+                <a:cs typeface="Courier"/>
+              </a:rPr>
+              <a:t>grep -v apple </a:t>
+            </a:r>
+            <a:r>
               <a:rPr lang="en-US" sz="2400" dirty="0" err="1">
                 <a:solidFill>
                   <a:srgbClr val="0000FF"/>
@@ -6499,27 +6509,7 @@
                 <a:latin typeface="Courier"/>
                 <a:cs typeface="Courier"/>
               </a:rPr>
-              <a:t>grep</a:t>
-            </a:r>
-            <a:r>
-              <a:rPr lang="en-US" sz="2400" dirty="0">
-                <a:solidFill>
-                  <a:srgbClr val="0000FF"/>
-                </a:solidFill>
-                <a:latin typeface="Courier"/>
-                <a:cs typeface="Courier"/>
-              </a:rPr>
-              <a:t> -v co </a:t>
-            </a:r>
-            <a:r>
-              <a:rPr lang="en-US" sz="2400" dirty="0" err="1">
-                <a:solidFill>
-                  <a:srgbClr val="0000FF"/>
-                </a:solidFill>
-                <a:latin typeface="Courier"/>
-                <a:cs typeface="Courier"/>
-              </a:rPr>
-              <a:t>watermelon_genes.unix.txt</a:t>
+              <a:t>fruit.txt</a:t>
             </a:r>
             <a:endParaRPr lang="en-US" sz="2400" dirty="0">
               <a:solidFill>
@@ -7237,22 +7227,25 @@
                 <a:latin typeface="Calibri Light" panose="020F0302020204030204" pitchFamily="34" charset="0"/>
                 <a:cs typeface="Calibri Light" panose="020F0302020204030204" pitchFamily="34" charset="0"/>
               </a:rPr>
-              <a:t>Make a single file with all the nucleotide sequences (</a:t>
+              <a:t>Make a single file with all the nucleotide sequences, call it </a:t>
             </a:r>
             <a:r>
               <a:rPr lang="en-US" sz="2400" dirty="0" err="1">
-                <a:latin typeface="Calibri Light" panose="020F0302020204030204" pitchFamily="34" charset="0"/>
-                <a:cs typeface="Calibri Light" panose="020F0302020204030204" pitchFamily="34" charset="0"/>
+                <a:solidFill>
+                  <a:srgbClr val="0432FF"/>
+                </a:solidFill>
+                <a:latin typeface="Courier New" panose="02070309020205020404" pitchFamily="49" charset="0"/>
+                <a:cs typeface="Courier New" panose="02070309020205020404" pitchFamily="49" charset="0"/>
               </a:rPr>
               <a:t>genes.fa</a:t>
             </a:r>
-            <a:r>
-              <a:rPr lang="en-US" sz="2400" dirty="0">
-                <a:latin typeface="Calibri Light" panose="020F0302020204030204" pitchFamily="34" charset="0"/>
-                <a:cs typeface="Calibri Light" panose="020F0302020204030204" pitchFamily="34" charset="0"/>
-              </a:rPr>
-              <a:t>)</a:t>
-            </a:r>
+            <a:endParaRPr lang="en-US" sz="2400" dirty="0">
+              <a:solidFill>
+                <a:srgbClr val="0432FF"/>
+              </a:solidFill>
+              <a:latin typeface="Courier New" panose="02070309020205020404" pitchFamily="49" charset="0"/>
+              <a:cs typeface="Courier New" panose="02070309020205020404" pitchFamily="49" charset="0"/>
+            </a:endParaRPr>
           </a:p>
           <a:p>
             <a:pPr marL="682625" lvl="1" indent="-457200">
@@ -7270,7 +7263,24 @@
                 <a:latin typeface="Calibri Light" panose="020F0302020204030204" pitchFamily="34" charset="0"/>
                 <a:cs typeface="Calibri Light" panose="020F0302020204030204" pitchFamily="34" charset="0"/>
               </a:rPr>
-              <a:t>Count the header lines in that file.</a:t>
+              <a:t>Count the header lines in </a:t>
+            </a:r>
+            <a:r>
+              <a:rPr lang="en-US" sz="2400" dirty="0" err="1">
+                <a:solidFill>
+                  <a:srgbClr val="0432FF"/>
+                </a:solidFill>
+                <a:latin typeface="Courier New" panose="02070309020205020404" pitchFamily="49" charset="0"/>
+                <a:cs typeface="Courier New" panose="02070309020205020404" pitchFamily="49" charset="0"/>
+              </a:rPr>
+              <a:t>genes.fa</a:t>
+            </a:r>
+            <a:r>
+              <a:rPr lang="en-US" sz="2400" dirty="0">
+                <a:latin typeface="Calibri Light" panose="020F0302020204030204" pitchFamily="34" charset="0"/>
+                <a:cs typeface="Calibri Light" panose="020F0302020204030204" pitchFamily="34" charset="0"/>
+              </a:rPr>
+              <a:t>.</a:t>
             </a:r>
             <a:endParaRPr lang="en-US" sz="2400" dirty="0">
               <a:solidFill>
@@ -14394,7 +14404,7 @@
                 <a:latin typeface="Calibri"/>
                 <a:cs typeface="Calibri"/>
               </a:rPr>
-              <a:t>Can also use 'Save As' in BBEdit to change line breaks.</a:t>
+              <a:t>Can also use 'Save As' in text editors to change line breaks.</a:t>
             </a:r>
           </a:p>
           <a:p>

</xml_diff>